<commit_message>
Fixed Event Grid template and enhanced the PowerShell
</commit_message>
<xml_diff>
--- a/Azure-Big-Data-Architecture.pptx
+++ b/Azure-Big-Data-Architecture.pptx
@@ -204,7 +204,7 @@
           <a:p>
             <a:fld id="{EA83CF9C-C7FF-4EB6-A798-9766F048BAC5}" type="datetimeFigureOut">
               <a:rPr lang="en-US" smtClean="0"/>
-              <a:t>4/14/2020</a:t>
+              <a:t>4/15/2020</a:t>
             </a:fld>
             <a:endParaRPr lang="en-US"/>
           </a:p>
@@ -618,7 +618,7 @@
           <a:p>
             <a:fld id="{8EFFCEF9-F465-4406-AD85-4D360CC7C1BF}" type="datetimeFigureOut">
               <a:rPr lang="en-US" smtClean="0"/>
-              <a:t>4/14/2020</a:t>
+              <a:t>4/15/2020</a:t>
             </a:fld>
             <a:endParaRPr lang="en-US"/>
           </a:p>
@@ -816,7 +816,7 @@
           <a:p>
             <a:fld id="{8EFFCEF9-F465-4406-AD85-4D360CC7C1BF}" type="datetimeFigureOut">
               <a:rPr lang="en-US" smtClean="0"/>
-              <a:t>4/14/2020</a:t>
+              <a:t>4/15/2020</a:t>
             </a:fld>
             <a:endParaRPr lang="en-US"/>
           </a:p>
@@ -1024,7 +1024,7 @@
           <a:p>
             <a:fld id="{8EFFCEF9-F465-4406-AD85-4D360CC7C1BF}" type="datetimeFigureOut">
               <a:rPr lang="en-US" smtClean="0"/>
-              <a:t>4/14/2020</a:t>
+              <a:t>4/15/2020</a:t>
             </a:fld>
             <a:endParaRPr lang="en-US"/>
           </a:p>
@@ -3106,7 +3106,7 @@
           <a:p>
             <a:fld id="{8EFFCEF9-F465-4406-AD85-4D360CC7C1BF}" type="datetimeFigureOut">
               <a:rPr lang="en-US" smtClean="0"/>
-              <a:t>4/14/2020</a:t>
+              <a:t>4/15/2020</a:t>
             </a:fld>
             <a:endParaRPr lang="en-US"/>
           </a:p>
@@ -7127,7 +7127,7 @@
           <a:p>
             <a:fld id="{8EFFCEF9-F465-4406-AD85-4D360CC7C1BF}" type="datetimeFigureOut">
               <a:rPr lang="en-US" smtClean="0"/>
-              <a:t>4/14/2020</a:t>
+              <a:t>4/15/2020</a:t>
             </a:fld>
             <a:endParaRPr lang="en-US"/>
           </a:p>
@@ -7900,7 +7900,7 @@
           <a:p>
             <a:fld id="{8EFFCEF9-F465-4406-AD85-4D360CC7C1BF}" type="datetimeFigureOut">
               <a:rPr lang="en-US" smtClean="0"/>
-              <a:t>4/14/2020</a:t>
+              <a:t>4/15/2020</a:t>
             </a:fld>
             <a:endParaRPr lang="en-US"/>
           </a:p>
@@ -8312,7 +8312,7 @@
           <a:p>
             <a:fld id="{8EFFCEF9-F465-4406-AD85-4D360CC7C1BF}" type="datetimeFigureOut">
               <a:rPr lang="en-US" smtClean="0"/>
-              <a:t>4/14/2020</a:t>
+              <a:t>4/15/2020</a:t>
             </a:fld>
             <a:endParaRPr lang="en-US"/>
           </a:p>
@@ -8453,7 +8453,7 @@
           <a:p>
             <a:fld id="{8EFFCEF9-F465-4406-AD85-4D360CC7C1BF}" type="datetimeFigureOut">
               <a:rPr lang="en-US" smtClean="0"/>
-              <a:t>4/14/2020</a:t>
+              <a:t>4/15/2020</a:t>
             </a:fld>
             <a:endParaRPr lang="en-US"/>
           </a:p>
@@ -8566,7 +8566,7 @@
           <a:p>
             <a:fld id="{8EFFCEF9-F465-4406-AD85-4D360CC7C1BF}" type="datetimeFigureOut">
               <a:rPr lang="en-US" smtClean="0"/>
-              <a:t>4/14/2020</a:t>
+              <a:t>4/15/2020</a:t>
             </a:fld>
             <a:endParaRPr lang="en-US"/>
           </a:p>
@@ -8877,7 +8877,7 @@
           <a:p>
             <a:fld id="{8EFFCEF9-F465-4406-AD85-4D360CC7C1BF}" type="datetimeFigureOut">
               <a:rPr lang="en-US" smtClean="0"/>
-              <a:t>4/14/2020</a:t>
+              <a:t>4/15/2020</a:t>
             </a:fld>
             <a:endParaRPr lang="en-US"/>
           </a:p>
@@ -9165,7 +9165,7 @@
           <a:p>
             <a:fld id="{8EFFCEF9-F465-4406-AD85-4D360CC7C1BF}" type="datetimeFigureOut">
               <a:rPr lang="en-US" smtClean="0"/>
-              <a:t>4/14/2020</a:t>
+              <a:t>4/15/2020</a:t>
             </a:fld>
             <a:endParaRPr lang="en-US"/>
           </a:p>
@@ -9406,7 +9406,7 @@
           <a:p>
             <a:fld id="{8EFFCEF9-F465-4406-AD85-4D360CC7C1BF}" type="datetimeFigureOut">
               <a:rPr lang="en-US" smtClean="0"/>
-              <a:t>4/14/2020</a:t>
+              <a:t>4/15/2020</a:t>
             </a:fld>
             <a:endParaRPr lang="en-US"/>
           </a:p>
@@ -11265,45 +11265,6 @@
           </a:p>
         </p:txBody>
       </p:sp>
-      <p:pic>
-        <p:nvPicPr>
-          <p:cNvPr id="63" name="Graphic 62">
-            <a:extLst>
-              <a:ext uri="{FF2B5EF4-FFF2-40B4-BE49-F238E27FC236}">
-                <a16:creationId xmlns:a16="http://schemas.microsoft.com/office/drawing/2014/main" id="{A61E79D4-1AF5-410E-ACC3-14F96660C0E4}"/>
-              </a:ext>
-            </a:extLst>
-          </p:cNvPr>
-          <p:cNvPicPr>
-            <a:picLocks noChangeAspect="1"/>
-          </p:cNvPicPr>
-          <p:nvPr/>
-        </p:nvPicPr>
-        <p:blipFill>
-          <a:blip r:embed="rId6">
-            <a:extLst>
-              <a:ext uri="{28A0092B-C50C-407E-A947-70E740481C1C}">
-                <a14:useLocalDpi xmlns:a14="http://schemas.microsoft.com/office/drawing/2010/main" val="0"/>
-              </a:ext>
-              <a:ext uri="{96DAC541-7B7A-43D3-8B79-37D633B846F1}">
-                <asvg:svgBlip xmlns:asvg="http://schemas.microsoft.com/office/drawing/2016/SVG/main" r:embed="rId7"/>
-              </a:ext>
-            </a:extLst>
-          </a:blip>
-          <a:stretch>
-            <a:fillRect/>
-          </a:stretch>
-        </p:blipFill>
-        <p:spPr>
-          <a:xfrm>
-            <a:off x="1565304" y="2188762"/>
-            <a:ext cx="313300" cy="313300"/>
-          </a:xfrm>
-          <a:prstGeom prst="rect">
-            <a:avLst/>
-          </a:prstGeom>
-        </p:spPr>
-      </p:pic>
       <p:cxnSp>
         <p:nvCxnSpPr>
           <p:cNvPr id="54" name="Straight Connector 53">
@@ -11357,7 +11318,7 @@
           <p:nvPr/>
         </p:nvPicPr>
         <p:blipFill>
-          <a:blip r:embed="rId8">
+          <a:blip r:embed="rId6">
             <a:extLst>
               <a:ext uri="{28A0092B-C50C-407E-A947-70E740481C1C}">
                 <a14:useLocalDpi xmlns:a14="http://schemas.microsoft.com/office/drawing/2010/main" val="0"/>
@@ -11404,7 +11365,7 @@
           <p:nvPr/>
         </p:nvPicPr>
         <p:blipFill>
-          <a:blip r:embed="rId9">
+          <a:blip r:embed="rId7">
             <a:extLst>
               <a:ext uri="{28A0092B-C50C-407E-A947-70E740481C1C}">
                 <a14:useLocalDpi xmlns:a14="http://schemas.microsoft.com/office/drawing/2010/main" val="0"/>
@@ -11451,7 +11412,7 @@
           <p:nvPr/>
         </p:nvPicPr>
         <p:blipFill>
-          <a:blip r:embed="rId10">
+          <a:blip r:embed="rId8">
             <a:extLst>
               <a:ext uri="{28A0092B-C50C-407E-A947-70E740481C1C}">
                 <a14:useLocalDpi xmlns:a14="http://schemas.microsoft.com/office/drawing/2010/main" val="0"/>
@@ -11487,7 +11448,7 @@
           <p:nvPr/>
         </p:nvPicPr>
         <p:blipFill>
-          <a:blip r:embed="rId11">
+          <a:blip r:embed="rId9">
             <a:extLst>
               <a:ext uri="{28A0092B-C50C-407E-A947-70E740481C1C}">
                 <a14:useLocalDpi xmlns:a14="http://schemas.microsoft.com/office/drawing/2010/main" val="0"/>
@@ -11521,10 +11482,10 @@
       </p:pic>
       <p:pic>
         <p:nvPicPr>
-          <p:cNvPr id="83" name="Picture 82" descr="A picture containing clock, sign&#10;&#10;Description automatically generated">
-            <a:extLst>
-              <a:ext uri="{FF2B5EF4-FFF2-40B4-BE49-F238E27FC236}">
-                <a16:creationId xmlns:a16="http://schemas.microsoft.com/office/drawing/2014/main" id="{B015B258-2CDD-454A-A212-C59A83E2D83D}"/>
+          <p:cNvPr id="84" name="Picture 83" descr="A close up of a sign&#10;&#10;Description automatically generated">
+            <a:extLst>
+              <a:ext uri="{FF2B5EF4-FFF2-40B4-BE49-F238E27FC236}">
+                <a16:creationId xmlns:a16="http://schemas.microsoft.com/office/drawing/2014/main" id="{E95737C5-7654-4098-B34E-32E7C7906F61}"/>
               </a:ext>
             </a:extLst>
           </p:cNvPr>
@@ -11534,43 +11495,7 @@
           <p:nvPr/>
         </p:nvPicPr>
         <p:blipFill>
-          <a:blip r:embed="rId12">
-            <a:extLst>
-              <a:ext uri="{28A0092B-C50C-407E-A947-70E740481C1C}">
-                <a14:useLocalDpi xmlns:a14="http://schemas.microsoft.com/office/drawing/2010/main" val="0"/>
-              </a:ext>
-            </a:extLst>
-          </a:blip>
-          <a:stretch>
-            <a:fillRect/>
-          </a:stretch>
-        </p:blipFill>
-        <p:spPr>
-          <a:xfrm>
-            <a:off x="2575094" y="2219330"/>
-            <a:ext cx="250963" cy="250963"/>
-          </a:xfrm>
-          <a:prstGeom prst="rect">
-            <a:avLst/>
-          </a:prstGeom>
-        </p:spPr>
-      </p:pic>
-      <p:pic>
-        <p:nvPicPr>
-          <p:cNvPr id="84" name="Picture 83" descr="A close up of a sign&#10;&#10;Description automatically generated">
-            <a:extLst>
-              <a:ext uri="{FF2B5EF4-FFF2-40B4-BE49-F238E27FC236}">
-                <a16:creationId xmlns:a16="http://schemas.microsoft.com/office/drawing/2014/main" id="{E95737C5-7654-4098-B34E-32E7C7906F61}"/>
-              </a:ext>
-            </a:extLst>
-          </p:cNvPr>
-          <p:cNvPicPr>
-            <a:picLocks noChangeAspect="1"/>
-          </p:cNvPicPr>
-          <p:nvPr/>
-        </p:nvPicPr>
-        <p:blipFill>
-          <a:blip r:embed="rId13">
+          <a:blip r:embed="rId10">
             <a:extLst>
               <a:ext uri="{28A0092B-C50C-407E-A947-70E740481C1C}">
                 <a14:useLocalDpi xmlns:a14="http://schemas.microsoft.com/office/drawing/2010/main" val="0"/>
@@ -11606,7 +11531,7 @@
           <p:nvPr/>
         </p:nvPicPr>
         <p:blipFill>
-          <a:blip r:embed="rId14">
+          <a:blip r:embed="rId11">
             <a:extLst>
               <a:ext uri="{28A0092B-C50C-407E-A947-70E740481C1C}">
                 <a14:useLocalDpi xmlns:a14="http://schemas.microsoft.com/office/drawing/2010/main" val="0"/>
@@ -11978,7 +11903,7 @@
           <p:nvPr/>
         </p:nvPicPr>
         <p:blipFill>
-          <a:blip r:embed="rId15">
+          <a:blip r:embed="rId12">
             <a:extLst>
               <a:ext uri="{28A0092B-C50C-407E-A947-70E740481C1C}">
                 <a14:useLocalDpi xmlns:a14="http://schemas.microsoft.com/office/drawing/2010/main" val="0"/>
@@ -12313,7 +12238,7 @@
           <p:nvPr/>
         </p:nvPicPr>
         <p:blipFill>
-          <a:blip r:embed="rId16">
+          <a:blip r:embed="rId13">
             <a:extLst>
               <a:ext uri="{28A0092B-C50C-407E-A947-70E740481C1C}">
                 <a14:useLocalDpi xmlns:a14="http://schemas.microsoft.com/office/drawing/2010/main" val="0"/>
@@ -12415,7 +12340,7 @@
         </p:nvCxnSpPr>
         <p:spPr>
           <a:xfrm flipH="1">
-            <a:off x="6380066" y="886524"/>
+            <a:off x="6380065" y="874369"/>
             <a:ext cx="1" cy="3842010"/>
           </a:xfrm>
           <a:prstGeom prst="line">
@@ -12724,15 +12649,16 @@
             </a:extLst>
           </p:cNvPr>
           <p:cNvCxnSpPr>
+            <a:cxnSpLocks/>
             <a:stCxn id="61" idx="3"/>
-            <a:endCxn id="63" idx="0"/>
+            <a:endCxn id="161" idx="0"/>
           </p:cNvCxnSpPr>
           <p:nvPr/>
         </p:nvCxnSpPr>
         <p:spPr>
           <a:xfrm>
             <a:off x="1055521" y="1452336"/>
-            <a:ext cx="666433" cy="736426"/>
+            <a:ext cx="666433" cy="774605"/>
           </a:xfrm>
           <a:prstGeom prst="bentConnector2">
             <a:avLst/>
@@ -12770,15 +12696,16 @@
             </a:extLst>
           </p:cNvPr>
           <p:cNvCxnSpPr>
+            <a:cxnSpLocks/>
             <a:stCxn id="90" idx="3"/>
-            <a:endCxn id="63" idx="1"/>
+            <a:endCxn id="161" idx="1"/>
           </p:cNvCxnSpPr>
           <p:nvPr/>
         </p:nvCxnSpPr>
         <p:spPr>
           <a:xfrm flipV="1">
-            <a:off x="1051182" y="2345412"/>
-            <a:ext cx="514122" cy="1095"/>
+            <a:off x="1051182" y="2345098"/>
+            <a:ext cx="552615" cy="1409"/>
           </a:xfrm>
           <a:prstGeom prst="straightConnector1">
             <a:avLst/>
@@ -12862,15 +12789,16 @@
             </a:extLst>
           </p:cNvPr>
           <p:cNvCxnSpPr>
+            <a:cxnSpLocks/>
             <a:stCxn id="91" idx="0"/>
-            <a:endCxn id="63" idx="2"/>
+            <a:endCxn id="161" idx="2"/>
           </p:cNvCxnSpPr>
           <p:nvPr/>
         </p:nvCxnSpPr>
         <p:spPr>
           <a:xfrm flipV="1">
-            <a:off x="1719283" y="2502062"/>
-            <a:ext cx="2671" cy="973154"/>
+            <a:off x="1719283" y="2463254"/>
+            <a:ext cx="2671" cy="1011962"/>
           </a:xfrm>
           <a:prstGeom prst="straightConnector1">
             <a:avLst/>
@@ -13063,7 +12991,7 @@
             <p:nvPr/>
           </p:nvPicPr>
           <p:blipFill>
-            <a:blip r:embed="rId10">
+            <a:blip r:embed="rId8">
               <a:extLst>
                 <a:ext uri="{28A0092B-C50C-407E-A947-70E740481C1C}">
                   <a14:useLocalDpi xmlns:a14="http://schemas.microsoft.com/office/drawing/2010/main" val="0"/>
@@ -13418,13 +13346,13 @@
             <p:nvPr/>
           </p:nvPicPr>
           <p:blipFill>
-            <a:blip r:embed="rId17">
+            <a:blip r:embed="rId14">
               <a:extLst>
                 <a:ext uri="{28A0092B-C50C-407E-A947-70E740481C1C}">
                   <a14:useLocalDpi xmlns:a14="http://schemas.microsoft.com/office/drawing/2010/main" val="0"/>
                 </a:ext>
                 <a:ext uri="{96DAC541-7B7A-43D3-8B79-37D633B846F1}">
-                  <asvg:svgBlip xmlns:asvg="http://schemas.microsoft.com/office/drawing/2016/SVG/main" r:embed="rId18"/>
+                  <asvg:svgBlip xmlns:asvg="http://schemas.microsoft.com/office/drawing/2016/SVG/main" r:embed="rId15"/>
                 </a:ext>
               </a:extLst>
             </a:blip>
@@ -13790,7 +13718,7 @@
             <p:nvPr/>
           </p:nvPicPr>
           <p:blipFill>
-            <a:blip r:embed="rId19">
+            <a:blip r:embed="rId16">
               <a:extLst>
                 <a:ext uri="{28A0092B-C50C-407E-A947-70E740481C1C}">
                   <a14:useLocalDpi xmlns:a14="http://schemas.microsoft.com/office/drawing/2010/main" val="0"/>
@@ -14156,7 +14084,7 @@
             <p:nvPr/>
           </p:nvPicPr>
           <p:blipFill>
-            <a:blip r:embed="rId16">
+            <a:blip r:embed="rId13">
               <a:extLst>
                 <a:ext uri="{28A0092B-C50C-407E-A947-70E740481C1C}">
                   <a14:useLocalDpi xmlns:a14="http://schemas.microsoft.com/office/drawing/2010/main" val="0"/>
@@ -14511,7 +14439,7 @@
             <p:nvPr/>
           </p:nvPicPr>
           <p:blipFill>
-            <a:blip r:embed="rId19">
+            <a:blip r:embed="rId16">
               <a:extLst>
                 <a:ext uri="{28A0092B-C50C-407E-A947-70E740481C1C}">
                   <a14:useLocalDpi xmlns:a14="http://schemas.microsoft.com/office/drawing/2010/main" val="0"/>
@@ -14877,7 +14805,7 @@
             <p:nvPr/>
           </p:nvPicPr>
           <p:blipFill>
-            <a:blip r:embed="rId20">
+            <a:blip r:embed="rId17">
               <a:extLst>
                 <a:ext uri="{28A0092B-C50C-407E-A947-70E740481C1C}">
                   <a14:useLocalDpi xmlns:a14="http://schemas.microsoft.com/office/drawing/2010/main" val="0"/>
@@ -14924,13 +14852,13 @@
             <p:nvPr/>
           </p:nvPicPr>
           <p:blipFill>
-            <a:blip r:embed="rId21">
+            <a:blip r:embed="rId18">
               <a:extLst>
                 <a:ext uri="{28A0092B-C50C-407E-A947-70E740481C1C}">
                   <a14:useLocalDpi xmlns:a14="http://schemas.microsoft.com/office/drawing/2010/main" val="0"/>
                 </a:ext>
                 <a:ext uri="{96DAC541-7B7A-43D3-8B79-37D633B846F1}">
-                  <asvg:svgBlip xmlns:asvg="http://schemas.microsoft.com/office/drawing/2016/SVG/main" r:embed="rId22"/>
+                  <asvg:svgBlip xmlns:asvg="http://schemas.microsoft.com/office/drawing/2016/SVG/main" r:embed="rId19"/>
                 </a:ext>
               </a:extLst>
             </a:blip>
@@ -15282,13 +15210,13 @@
             <p:nvPr/>
           </p:nvPicPr>
           <p:blipFill>
-            <a:blip r:embed="rId23">
+            <a:blip r:embed="rId20">
               <a:extLst>
                 <a:ext uri="{28A0092B-C50C-407E-A947-70E740481C1C}">
                   <a14:useLocalDpi xmlns:a14="http://schemas.microsoft.com/office/drawing/2010/main" val="0"/>
                 </a:ext>
                 <a:ext uri="{96DAC541-7B7A-43D3-8B79-37D633B846F1}">
-                  <asvg:svgBlip xmlns:asvg="http://schemas.microsoft.com/office/drawing/2016/SVG/main" r:embed="rId24"/>
+                  <asvg:svgBlip xmlns:asvg="http://schemas.microsoft.com/office/drawing/2016/SVG/main" r:embed="rId21"/>
                 </a:ext>
               </a:extLst>
             </a:blip>
@@ -16028,15 +15956,15 @@
           </p:cNvPr>
           <p:cNvCxnSpPr>
             <a:cxnSpLocks/>
-            <a:stCxn id="63" idx="3"/>
+            <a:stCxn id="161" idx="3"/>
             <a:endCxn id="95" idx="1"/>
           </p:cNvCxnSpPr>
           <p:nvPr/>
         </p:nvCxnSpPr>
         <p:spPr>
           <a:xfrm flipV="1">
-            <a:off x="1878604" y="2344811"/>
-            <a:ext cx="383377" cy="601"/>
+            <a:off x="1840110" y="2344811"/>
+            <a:ext cx="421871" cy="287"/>
           </a:xfrm>
           <a:prstGeom prst="line">
             <a:avLst/>
@@ -16082,7 +16010,7 @@
           <p:nvPr/>
         </p:nvPicPr>
         <p:blipFill>
-          <a:blip r:embed="rId16">
+          <a:blip r:embed="rId13">
             <a:extLst>
               <a:ext uri="{28A0092B-C50C-407E-A947-70E740481C1C}">
                 <a14:useLocalDpi xmlns:a14="http://schemas.microsoft.com/office/drawing/2010/main" val="0"/>
@@ -16168,13 +16096,13 @@
           <p:nvPr/>
         </p:nvPicPr>
         <p:blipFill>
-          <a:blip r:embed="rId25">
+          <a:blip r:embed="rId22">
             <a:extLst>
               <a:ext uri="{28A0092B-C50C-407E-A947-70E740481C1C}">
                 <a14:useLocalDpi xmlns:a14="http://schemas.microsoft.com/office/drawing/2010/main" val="0"/>
               </a:ext>
               <a:ext uri="{96DAC541-7B7A-43D3-8B79-37D633B846F1}">
-                <asvg:svgBlip xmlns:asvg="http://schemas.microsoft.com/office/drawing/2016/SVG/main" r:embed="rId26"/>
+                <asvg:svgBlip xmlns:asvg="http://schemas.microsoft.com/office/drawing/2016/SVG/main" r:embed="rId23"/>
               </a:ext>
             </a:extLst>
           </a:blip>
@@ -16270,7 +16198,7 @@
             <p:nvPr/>
           </p:nvPicPr>
           <p:blipFill>
-            <a:blip r:embed="rId27">
+            <a:blip r:embed="rId24">
               <a:extLst>
                 <a:ext uri="{28A0092B-C50C-407E-A947-70E740481C1C}">
                   <a14:useLocalDpi xmlns:a14="http://schemas.microsoft.com/office/drawing/2010/main" val="0"/>
@@ -16999,7 +16927,7 @@
           <p:nvPr/>
         </p:nvPicPr>
         <p:blipFill>
-          <a:blip r:embed="rId28"/>
+          <a:blip r:embed="rId25"/>
           <a:stretch>
             <a:fillRect/>
           </a:stretch>
@@ -17029,7 +16957,7 @@
           <p:nvPr/>
         </p:nvPicPr>
         <p:blipFill>
-          <a:blip r:embed="rId29">
+          <a:blip r:embed="rId26">
             <a:extLst>
               <a:ext uri="{28A0092B-C50C-407E-A947-70E740481C1C}">
                 <a14:useLocalDpi xmlns:a14="http://schemas.microsoft.com/office/drawing/2010/main" val="0"/>
@@ -17363,7 +17291,7 @@
           <p:nvPr/>
         </p:nvPicPr>
         <p:blipFill>
-          <a:blip r:embed="rId30"/>
+          <a:blip r:embed="rId27"/>
           <a:stretch>
             <a:fillRect/>
           </a:stretch>
@@ -18605,7 +18533,7 @@
             <p:nvPr/>
           </p:nvPicPr>
           <p:blipFill>
-            <a:blip r:embed="rId31">
+            <a:blip r:embed="rId28">
               <a:extLst>
                 <a:ext uri="{28A0092B-C50C-407E-A947-70E740481C1C}">
                   <a14:useLocalDpi xmlns:a14="http://schemas.microsoft.com/office/drawing/2010/main" val="0"/>
@@ -18960,7 +18888,7 @@
             <p:nvPr/>
           </p:nvPicPr>
           <p:blipFill>
-            <a:blip r:embed="rId31">
+            <a:blip r:embed="rId28">
               <a:extLst>
                 <a:ext uri="{28A0092B-C50C-407E-A947-70E740481C1C}">
                   <a14:useLocalDpi xmlns:a14="http://schemas.microsoft.com/office/drawing/2010/main" val="0"/>
@@ -19336,7 +19264,7 @@
             <p:nvPr/>
           </p:nvPicPr>
           <p:blipFill>
-            <a:blip r:embed="rId32">
+            <a:blip r:embed="rId29">
               <a:extLst>
                 <a:ext uri="{28A0092B-C50C-407E-A947-70E740481C1C}">
                   <a14:useLocalDpi xmlns:a14="http://schemas.microsoft.com/office/drawing/2010/main" val="0"/>
@@ -19372,7 +19300,7 @@
             <p:nvPr/>
           </p:nvPicPr>
           <p:blipFill>
-            <a:blip r:embed="rId19">
+            <a:blip r:embed="rId16">
               <a:extLst>
                 <a:ext uri="{28A0092B-C50C-407E-A947-70E740481C1C}">
                   <a14:useLocalDpi xmlns:a14="http://schemas.microsoft.com/office/drawing/2010/main" val="0"/>
@@ -20136,13 +20064,13 @@
             <p:nvPr/>
           </p:nvPicPr>
           <p:blipFill>
-            <a:blip r:embed="rId33">
+            <a:blip r:embed="rId30">
               <a:extLst>
                 <a:ext uri="{28A0092B-C50C-407E-A947-70E740481C1C}">
                   <a14:useLocalDpi xmlns:a14="http://schemas.microsoft.com/office/drawing/2010/main" val="0"/>
                 </a:ext>
                 <a:ext uri="{96DAC541-7B7A-43D3-8B79-37D633B846F1}">
-                  <asvg:svgBlip xmlns:asvg="http://schemas.microsoft.com/office/drawing/2016/SVG/main" r:embed="rId34"/>
+                  <asvg:svgBlip xmlns:asvg="http://schemas.microsoft.com/office/drawing/2016/SVG/main" r:embed="rId31"/>
                 </a:ext>
               </a:extLst>
             </a:blip>
@@ -20949,7 +20877,7 @@
             <p:nvPr/>
           </p:nvPicPr>
           <p:blipFill>
-            <a:blip r:embed="rId35">
+            <a:blip r:embed="rId32">
               <a:extLst>
                 <a:ext uri="{28A0092B-C50C-407E-A947-70E740481C1C}">
                   <a14:useLocalDpi xmlns:a14="http://schemas.microsoft.com/office/drawing/2010/main" val="0"/>
@@ -21774,7 +21702,7 @@
             <p:nvPr/>
           </p:nvPicPr>
           <p:blipFill>
-            <a:blip r:embed="rId28"/>
+            <a:blip r:embed="rId25"/>
             <a:stretch>
               <a:fillRect/>
             </a:stretch>
@@ -21804,7 +21732,7 @@
             <p:nvPr/>
           </p:nvPicPr>
           <p:blipFill>
-            <a:blip r:embed="rId19">
+            <a:blip r:embed="rId16">
               <a:extLst>
                 <a:ext uri="{28A0092B-C50C-407E-A947-70E740481C1C}">
                   <a14:useLocalDpi xmlns:a14="http://schemas.microsoft.com/office/drawing/2010/main" val="0"/>
@@ -22143,6 +22071,81 @@
           </a:p>
         </p:txBody>
       </p:sp>
+      <p:pic>
+        <p:nvPicPr>
+          <p:cNvPr id="161" name="Graphic 160">
+            <a:extLst>
+              <a:ext uri="{FF2B5EF4-FFF2-40B4-BE49-F238E27FC236}">
+                <a16:creationId xmlns:a16="http://schemas.microsoft.com/office/drawing/2014/main" id="{3773368F-8E79-44D6-800B-4127FBB72333}"/>
+              </a:ext>
+            </a:extLst>
+          </p:cNvPr>
+          <p:cNvPicPr>
+            <a:picLocks noChangeAspect="1"/>
+          </p:cNvPicPr>
+          <p:nvPr/>
+        </p:nvPicPr>
+        <p:blipFill>
+          <a:blip r:embed="rId20">
+            <a:extLst>
+              <a:ext uri="{28A0092B-C50C-407E-A947-70E740481C1C}">
+                <a14:useLocalDpi xmlns:a14="http://schemas.microsoft.com/office/drawing/2010/main" val="0"/>
+              </a:ext>
+              <a:ext uri="{96DAC541-7B7A-43D3-8B79-37D633B846F1}">
+                <asvg:svgBlip xmlns:asvg="http://schemas.microsoft.com/office/drawing/2016/SVG/main" r:embed="rId21"/>
+              </a:ext>
+            </a:extLst>
+          </a:blip>
+          <a:stretch>
+            <a:fillRect/>
+          </a:stretch>
+        </p:blipFill>
+        <p:spPr>
+          <a:xfrm>
+            <a:off x="1603797" y="2226941"/>
+            <a:ext cx="236313" cy="236313"/>
+          </a:xfrm>
+          <a:prstGeom prst="rect">
+            <a:avLst/>
+          </a:prstGeom>
+        </p:spPr>
+      </p:pic>
+      <p:pic>
+        <p:nvPicPr>
+          <p:cNvPr id="14" name="Picture 13" descr="A picture containing drawing&#10;&#10;Description automatically generated">
+            <a:extLst>
+              <a:ext uri="{FF2B5EF4-FFF2-40B4-BE49-F238E27FC236}">
+                <a16:creationId xmlns:a16="http://schemas.microsoft.com/office/drawing/2014/main" id="{D125C82F-A210-4533-A113-562EF23C1FEB}"/>
+              </a:ext>
+            </a:extLst>
+          </p:cNvPr>
+          <p:cNvPicPr>
+            <a:picLocks noChangeAspect="1"/>
+          </p:cNvPicPr>
+          <p:nvPr/>
+        </p:nvPicPr>
+        <p:blipFill>
+          <a:blip r:embed="rId33">
+            <a:extLst>
+              <a:ext uri="{28A0092B-C50C-407E-A947-70E740481C1C}">
+                <a14:useLocalDpi xmlns:a14="http://schemas.microsoft.com/office/drawing/2010/main" val="0"/>
+              </a:ext>
+            </a:extLst>
+          </a:blip>
+          <a:stretch>
+            <a:fillRect/>
+          </a:stretch>
+        </p:blipFill>
+        <p:spPr>
+          <a:xfrm>
+            <a:off x="2512536" y="2188269"/>
+            <a:ext cx="313084" cy="313084"/>
+          </a:xfrm>
+          <a:prstGeom prst="rect">
+            <a:avLst/>
+          </a:prstGeom>
+        </p:spPr>
+      </p:pic>
     </p:spTree>
     <p:extLst>
       <p:ext uri="{BB962C8B-B14F-4D97-AF65-F5344CB8AC3E}">
@@ -26413,42 +26416,6 @@
           </a:fontRef>
         </p:style>
       </p:cxnSp>
-      <p:pic>
-        <p:nvPicPr>
-          <p:cNvPr id="34" name="Picture 33" descr="A picture containing clock, sign&#10;&#10;Description automatically generated">
-            <a:extLst>
-              <a:ext uri="{FF2B5EF4-FFF2-40B4-BE49-F238E27FC236}">
-                <a16:creationId xmlns:a16="http://schemas.microsoft.com/office/drawing/2014/main" id="{66B59566-A60B-4371-8532-916681FE4477}"/>
-              </a:ext>
-            </a:extLst>
-          </p:cNvPr>
-          <p:cNvPicPr>
-            <a:picLocks noChangeAspect="1"/>
-          </p:cNvPicPr>
-          <p:nvPr/>
-        </p:nvPicPr>
-        <p:blipFill>
-          <a:blip r:embed="rId3">
-            <a:extLst>
-              <a:ext uri="{28A0092B-C50C-407E-A947-70E740481C1C}">
-                <a14:useLocalDpi xmlns:a14="http://schemas.microsoft.com/office/drawing/2010/main" val="0"/>
-              </a:ext>
-            </a:extLst>
-          </a:blip>
-          <a:stretch>
-            <a:fillRect/>
-          </a:stretch>
-        </p:blipFill>
-        <p:spPr>
-          <a:xfrm>
-            <a:off x="4529667" y="3341445"/>
-            <a:ext cx="290438" cy="290438"/>
-          </a:xfrm>
-          <a:prstGeom prst="rect">
-            <a:avLst/>
-          </a:prstGeom>
-        </p:spPr>
-      </p:pic>
       <p:sp>
         <p:nvSpPr>
           <p:cNvPr id="35" name="Lightning Bolt 34">
@@ -26513,15 +26480,16 @@
             </a:extLst>
           </p:cNvPr>
           <p:cNvCxnSpPr>
+            <a:cxnSpLocks/>
             <a:stCxn id="35" idx="2"/>
-            <a:endCxn id="34" idx="1"/>
+            <a:endCxn id="3" idx="1"/>
           </p:cNvCxnSpPr>
           <p:nvPr/>
         </p:nvCxnSpPr>
         <p:spPr>
           <a:xfrm>
             <a:off x="2577608" y="3486531"/>
-            <a:ext cx="1952059" cy="133"/>
+            <a:ext cx="1904191" cy="6318"/>
           </a:xfrm>
           <a:prstGeom prst="straightConnector1">
             <a:avLst/>
@@ -26702,7 +26670,7 @@
         <p:spPr>
           <a:xfrm>
             <a:off x="4404265" y="3959480"/>
-            <a:ext cx="1551165" cy="1938992"/>
+            <a:ext cx="1551165" cy="2092881"/>
           </a:xfrm>
           <a:prstGeom prst="rect">
             <a:avLst/>
@@ -26720,7 +26688,7 @@
               <a:buChar char="•"/>
             </a:pPr>
             <a:r>
-              <a:rPr lang="en-US" sz="1000">
+              <a:rPr lang="en-US" sz="1000" dirty="0">
                 <a:solidFill>
                   <a:schemeClr val="tx1">
                     <a:lumMod val="50000"/>
@@ -26728,7 +26696,7 @@
                   </a:schemeClr>
                 </a:solidFill>
               </a:rPr>
-              <a:t>Service Bus can be configured to remove duplicates in case of duplicated events.</a:t>
+              <a:t>An Azure Queue is used for simplicity.  Azure Storage Explorer lets you easily view the queue.</a:t>
             </a:r>
           </a:p>
           <a:p>
@@ -26737,7 +26705,7 @@
               <a:buChar char="•"/>
             </a:pPr>
             <a:r>
-              <a:rPr lang="en-US" sz="1000">
+              <a:rPr lang="en-US" sz="1000" dirty="0">
                 <a:solidFill>
                   <a:schemeClr val="tx1">
                     <a:lumMod val="50000"/>
@@ -26745,8 +26713,18 @@
                   </a:schemeClr>
                 </a:solidFill>
               </a:rPr>
-              <a:t>An Azure Queue can also be used if the features of Service Bus are not required.  Azure Storage Explorer lets you easily view the queue.</a:t>
-            </a:r>
+              <a:t>Service Bus can be used instead of blob queues configured to remove duplicates in case of duplicated events.</a:t>
+            </a:r>
+          </a:p>
+          <a:p>
+            <a:endParaRPr lang="en-US" sz="1000" dirty="0">
+              <a:solidFill>
+                <a:schemeClr val="tx1">
+                  <a:lumMod val="50000"/>
+                  <a:lumOff val="50000"/>
+                </a:schemeClr>
+              </a:solidFill>
+            </a:endParaRPr>
           </a:p>
         </p:txBody>
       </p:sp>
@@ -26765,7 +26743,7 @@
           <p:nvPr/>
         </p:nvPicPr>
         <p:blipFill>
-          <a:blip r:embed="rId4">
+          <a:blip r:embed="rId3">
             <a:extLst>
               <a:ext uri="{28A0092B-C50C-407E-A947-70E740481C1C}">
                 <a14:useLocalDpi xmlns:a14="http://schemas.microsoft.com/office/drawing/2010/main" val="0"/>
@@ -26797,15 +26775,15 @@
           </p:cNvPr>
           <p:cNvCxnSpPr>
             <a:cxnSpLocks/>
-            <a:stCxn id="34" idx="3"/>
+            <a:stCxn id="3" idx="3"/>
             <a:endCxn id="45" idx="1"/>
           </p:cNvCxnSpPr>
           <p:nvPr/>
         </p:nvCxnSpPr>
         <p:spPr>
           <a:xfrm flipV="1">
-            <a:off x="4820105" y="3486531"/>
-            <a:ext cx="1371781" cy="133"/>
+            <a:off x="4867974" y="3486531"/>
+            <a:ext cx="1323912" cy="6318"/>
           </a:xfrm>
           <a:prstGeom prst="straightConnector1">
             <a:avLst/>
@@ -26844,7 +26822,7 @@
           <p:nvPr/>
         </p:nvPicPr>
         <p:blipFill>
-          <a:blip r:embed="rId5">
+          <a:blip r:embed="rId4">
             <a:extLst>
               <a:ext uri="{28A0092B-C50C-407E-A947-70E740481C1C}">
                 <a14:useLocalDpi xmlns:a14="http://schemas.microsoft.com/office/drawing/2010/main" val="0"/>
@@ -27015,7 +26993,7 @@
           <p:nvPr/>
         </p:nvPicPr>
         <p:blipFill>
-          <a:blip r:embed="rId6">
+          <a:blip r:embed="rId5">
             <a:extLst>
               <a:ext uri="{28A0092B-C50C-407E-A947-70E740481C1C}">
                 <a14:useLocalDpi xmlns:a14="http://schemas.microsoft.com/office/drawing/2010/main" val="0"/>
@@ -27549,6 +27527,42 @@
           </a:p>
         </p:txBody>
       </p:sp>
+      <p:pic>
+        <p:nvPicPr>
+          <p:cNvPr id="3" name="Picture 2" descr="A picture containing drawing&#10;&#10;Description automatically generated">
+            <a:extLst>
+              <a:ext uri="{FF2B5EF4-FFF2-40B4-BE49-F238E27FC236}">
+                <a16:creationId xmlns:a16="http://schemas.microsoft.com/office/drawing/2014/main" id="{57C51817-8C7A-4D3D-90D2-64A99D97B38D}"/>
+              </a:ext>
+            </a:extLst>
+          </p:cNvPr>
+          <p:cNvPicPr>
+            <a:picLocks noChangeAspect="1"/>
+          </p:cNvPicPr>
+          <p:nvPr/>
+        </p:nvPicPr>
+        <p:blipFill>
+          <a:blip r:embed="rId6">
+            <a:extLst>
+              <a:ext uri="{28A0092B-C50C-407E-A947-70E740481C1C}">
+                <a14:useLocalDpi xmlns:a14="http://schemas.microsoft.com/office/drawing/2010/main" val="0"/>
+              </a:ext>
+            </a:extLst>
+          </a:blip>
+          <a:stretch>
+            <a:fillRect/>
+          </a:stretch>
+        </p:blipFill>
+        <p:spPr>
+          <a:xfrm>
+            <a:off x="4481799" y="3299761"/>
+            <a:ext cx="386175" cy="386175"/>
+          </a:xfrm>
+          <a:prstGeom prst="rect">
+            <a:avLst/>
+          </a:prstGeom>
+        </p:spPr>
+      </p:pic>
     </p:spTree>
     <p:extLst>
       <p:ext uri="{BB962C8B-B14F-4D97-AF65-F5344CB8AC3E}">
@@ -35206,13 +35220,12 @@
 </file>
 
 <file path=customXml/item1.xml><?xml version="1.0" encoding="utf-8"?>
-<p:properties xmlns:p="http://schemas.microsoft.com/office/2006/metadata/properties" xmlns:xsi="http://www.w3.org/2001/XMLSchema-instance" xmlns:pc="http://schemas.microsoft.com/office/infopath/2007/PartnerControls">
-  <documentManagement>
-    <_ip_UnifiedCompliancePolicyUIAction xmlns="http://schemas.microsoft.com/sharepoint/v3" xsi:nil="true"/>
-    <_STS_x0020_Hashtags xmlns="912cb619-99d2-4794-acea-8354d3da3f58"/>
-    <_ip_UnifiedCompliancePolicyProperties xmlns="http://schemas.microsoft.com/sharepoint/v3" xsi:nil="true"/>
-  </documentManagement>
-</p:properties>
+<?mso-contentType ?>
+<FormTemplates xmlns="http://schemas.microsoft.com/sharepoint/v3/contenttype/forms">
+  <Display>DocumentLibraryForm</Display>
+  <Edit>DocumentLibraryForm</Edit>
+  <New>DocumentLibraryForm</New>
+</FormTemplates>
 </file>
 
 <file path=customXml/item2.xml><?xml version="1.0" encoding="utf-8"?>
@@ -35490,28 +35503,19 @@
 </file>
 
 <file path=customXml/item3.xml><?xml version="1.0" encoding="utf-8"?>
-<?mso-contentType ?>
-<FormTemplates xmlns="http://schemas.microsoft.com/sharepoint/v3/contenttype/forms">
-  <Display>DocumentLibraryForm</Display>
-  <Edit>DocumentLibraryForm</Edit>
-  <New>DocumentLibraryForm</New>
-</FormTemplates>
+<p:properties xmlns:p="http://schemas.microsoft.com/office/2006/metadata/properties" xmlns:xsi="http://www.w3.org/2001/XMLSchema-instance" xmlns:pc="http://schemas.microsoft.com/office/infopath/2007/PartnerControls">
+  <documentManagement>
+    <_ip_UnifiedCompliancePolicyUIAction xmlns="http://schemas.microsoft.com/sharepoint/v3" xsi:nil="true"/>
+    <_STS_x0020_Hashtags xmlns="912cb619-99d2-4794-acea-8354d3da3f58"/>
+    <_ip_UnifiedCompliancePolicyProperties xmlns="http://schemas.microsoft.com/sharepoint/v3" xsi:nil="true"/>
+  </documentManagement>
+</p:properties>
 </file>
 
 <file path=customXml/itemProps1.xml><?xml version="1.0" encoding="utf-8"?>
-<ds:datastoreItem xmlns:ds="http://schemas.openxmlformats.org/officeDocument/2006/customXml" ds:itemID="{4E00FC4D-E764-4B84-A53F-BFAC454B6160}">
+<ds:datastoreItem xmlns:ds="http://schemas.openxmlformats.org/officeDocument/2006/customXml" ds:itemID="{D980A987-62EE-4DAB-81C0-1DF71B5A84CA}">
   <ds:schemaRefs>
-    <ds:schemaRef ds:uri="http://purl.org/dc/terms/"/>
-    <ds:schemaRef ds:uri="http://www.w3.org/XML/1998/namespace"/>
-    <ds:schemaRef ds:uri="912cb619-99d2-4794-acea-8354d3da3f58"/>
-    <ds:schemaRef ds:uri="d02dc944-d877-4fdc-84c6-4fb412a3c730"/>
-    <ds:schemaRef ds:uri="http://schemas.microsoft.com/office/2006/documentManagement/types"/>
-    <ds:schemaRef ds:uri="http://purl.org/dc/elements/1.1/"/>
-    <ds:schemaRef ds:uri="http://schemas.openxmlformats.org/package/2006/metadata/core-properties"/>
-    <ds:schemaRef ds:uri="http://schemas.microsoft.com/office/infopath/2007/PartnerControls"/>
-    <ds:schemaRef ds:uri="http://schemas.microsoft.com/sharepoint/v3"/>
-    <ds:schemaRef ds:uri="http://schemas.microsoft.com/office/2006/metadata/properties"/>
-    <ds:schemaRef ds:uri="http://purl.org/dc/dcmitype/"/>
+    <ds:schemaRef ds:uri="http://schemas.microsoft.com/sharepoint/v3/contenttype/forms"/>
   </ds:schemaRefs>
 </ds:datastoreItem>
 </file>
@@ -35537,9 +35541,19 @@
 </file>
 
 <file path=customXml/itemProps3.xml><?xml version="1.0" encoding="utf-8"?>
-<ds:datastoreItem xmlns:ds="http://schemas.openxmlformats.org/officeDocument/2006/customXml" ds:itemID="{D980A987-62EE-4DAB-81C0-1DF71B5A84CA}">
+<ds:datastoreItem xmlns:ds="http://schemas.openxmlformats.org/officeDocument/2006/customXml" ds:itemID="{4E00FC4D-E764-4B84-A53F-BFAC454B6160}">
   <ds:schemaRefs>
-    <ds:schemaRef ds:uri="http://schemas.microsoft.com/sharepoint/v3/contenttype/forms"/>
+    <ds:schemaRef ds:uri="http://purl.org/dc/terms/"/>
+    <ds:schemaRef ds:uri="http://www.w3.org/XML/1998/namespace"/>
+    <ds:schemaRef ds:uri="912cb619-99d2-4794-acea-8354d3da3f58"/>
+    <ds:schemaRef ds:uri="d02dc944-d877-4fdc-84c6-4fb412a3c730"/>
+    <ds:schemaRef ds:uri="http://schemas.microsoft.com/office/2006/documentManagement/types"/>
+    <ds:schemaRef ds:uri="http://purl.org/dc/elements/1.1/"/>
+    <ds:schemaRef ds:uri="http://schemas.openxmlformats.org/package/2006/metadata/core-properties"/>
+    <ds:schemaRef ds:uri="http://schemas.microsoft.com/office/infopath/2007/PartnerControls"/>
+    <ds:schemaRef ds:uri="http://schemas.microsoft.com/sharepoint/v3"/>
+    <ds:schemaRef ds:uri="http://schemas.microsoft.com/office/2006/metadata/properties"/>
+    <ds:schemaRef ds:uri="http://purl.org/dc/dcmitype/"/>
   </ds:schemaRefs>
 </ds:datastoreItem>
 </file>
</xml_diff>

<commit_message>
Added data share to diagram
</commit_message>
<xml_diff>
--- a/Azure-Big-Data-Architecture.pptx
+++ b/Azure-Big-Data-Architecture.pptx
@@ -206,7 +206,7 @@
           <a:p>
             <a:fld id="{EA83CF9C-C7FF-4EB6-A798-9766F048BAC5}" type="datetimeFigureOut">
               <a:rPr lang="en-US" smtClean="0"/>
-              <a:t>4/16/2020</a:t>
+              <a:t>4/17/2020</a:t>
             </a:fld>
             <a:endParaRPr lang="en-US"/>
           </a:p>
@@ -620,7 +620,7 @@
           <a:p>
             <a:fld id="{8EFFCEF9-F465-4406-AD85-4D360CC7C1BF}" type="datetimeFigureOut">
               <a:rPr lang="en-US" smtClean="0"/>
-              <a:t>4/16/2020</a:t>
+              <a:t>4/17/2020</a:t>
             </a:fld>
             <a:endParaRPr lang="en-US"/>
           </a:p>
@@ -818,7 +818,7 @@
           <a:p>
             <a:fld id="{8EFFCEF9-F465-4406-AD85-4D360CC7C1BF}" type="datetimeFigureOut">
               <a:rPr lang="en-US" smtClean="0"/>
-              <a:t>4/16/2020</a:t>
+              <a:t>4/17/2020</a:t>
             </a:fld>
             <a:endParaRPr lang="en-US"/>
           </a:p>
@@ -1026,7 +1026,7 @@
           <a:p>
             <a:fld id="{8EFFCEF9-F465-4406-AD85-4D360CC7C1BF}" type="datetimeFigureOut">
               <a:rPr lang="en-US" smtClean="0"/>
-              <a:t>4/16/2020</a:t>
+              <a:t>4/17/2020</a:t>
             </a:fld>
             <a:endParaRPr lang="en-US"/>
           </a:p>
@@ -3108,7 +3108,7 @@
           <a:p>
             <a:fld id="{8EFFCEF9-F465-4406-AD85-4D360CC7C1BF}" type="datetimeFigureOut">
               <a:rPr lang="en-US" smtClean="0"/>
-              <a:t>4/16/2020</a:t>
+              <a:t>4/17/2020</a:t>
             </a:fld>
             <a:endParaRPr lang="en-US"/>
           </a:p>
@@ -7129,7 +7129,7 @@
           <a:p>
             <a:fld id="{8EFFCEF9-F465-4406-AD85-4D360CC7C1BF}" type="datetimeFigureOut">
               <a:rPr lang="en-US" smtClean="0"/>
-              <a:t>4/16/2020</a:t>
+              <a:t>4/17/2020</a:t>
             </a:fld>
             <a:endParaRPr lang="en-US"/>
           </a:p>
@@ -7902,7 +7902,7 @@
           <a:p>
             <a:fld id="{8EFFCEF9-F465-4406-AD85-4D360CC7C1BF}" type="datetimeFigureOut">
               <a:rPr lang="en-US" smtClean="0"/>
-              <a:t>4/16/2020</a:t>
+              <a:t>4/17/2020</a:t>
             </a:fld>
             <a:endParaRPr lang="en-US"/>
           </a:p>
@@ -8314,7 +8314,7 @@
           <a:p>
             <a:fld id="{8EFFCEF9-F465-4406-AD85-4D360CC7C1BF}" type="datetimeFigureOut">
               <a:rPr lang="en-US" smtClean="0"/>
-              <a:t>4/16/2020</a:t>
+              <a:t>4/17/2020</a:t>
             </a:fld>
             <a:endParaRPr lang="en-US"/>
           </a:p>
@@ -8455,7 +8455,7 @@
           <a:p>
             <a:fld id="{8EFFCEF9-F465-4406-AD85-4D360CC7C1BF}" type="datetimeFigureOut">
               <a:rPr lang="en-US" smtClean="0"/>
-              <a:t>4/16/2020</a:t>
+              <a:t>4/17/2020</a:t>
             </a:fld>
             <a:endParaRPr lang="en-US"/>
           </a:p>
@@ -8568,7 +8568,7 @@
           <a:p>
             <a:fld id="{8EFFCEF9-F465-4406-AD85-4D360CC7C1BF}" type="datetimeFigureOut">
               <a:rPr lang="en-US" smtClean="0"/>
-              <a:t>4/16/2020</a:t>
+              <a:t>4/17/2020</a:t>
             </a:fld>
             <a:endParaRPr lang="en-US"/>
           </a:p>
@@ -8879,7 +8879,7 @@
           <a:p>
             <a:fld id="{8EFFCEF9-F465-4406-AD85-4D360CC7C1BF}" type="datetimeFigureOut">
               <a:rPr lang="en-US" smtClean="0"/>
-              <a:t>4/16/2020</a:t>
+              <a:t>4/17/2020</a:t>
             </a:fld>
             <a:endParaRPr lang="en-US"/>
           </a:p>
@@ -9167,7 +9167,7 @@
           <a:p>
             <a:fld id="{8EFFCEF9-F465-4406-AD85-4D360CC7C1BF}" type="datetimeFigureOut">
               <a:rPr lang="en-US" smtClean="0"/>
-              <a:t>4/16/2020</a:t>
+              <a:t>4/17/2020</a:t>
             </a:fld>
             <a:endParaRPr lang="en-US"/>
           </a:p>
@@ -9408,7 +9408,7 @@
           <a:p>
             <a:fld id="{8EFFCEF9-F465-4406-AD85-4D360CC7C1BF}" type="datetimeFigureOut">
               <a:rPr lang="en-US" smtClean="0"/>
-              <a:t>4/16/2020</a:t>
+              <a:t>4/17/2020</a:t>
             </a:fld>
             <a:endParaRPr lang="en-US"/>
           </a:p>
@@ -12636,7 +12636,7 @@
                 <a:ea typeface="+mn-ea"/>
                 <a:cs typeface="Segoe UI Semibold" panose="020B0702040204020203" pitchFamily="34" charset="0"/>
               </a:rPr>
-              <a:t>Serve</a:t>
+              <a:t>Serve / Data Sharing</a:t>
             </a:r>
           </a:p>
         </p:txBody>
@@ -20314,7 +20314,7 @@
         </p:nvGrpSpPr>
         <p:grpSpPr>
           <a:xfrm>
-            <a:off x="10565740" y="1779994"/>
+            <a:off x="10524570" y="1328543"/>
             <a:ext cx="919561" cy="604044"/>
             <a:chOff x="10533297" y="1779994"/>
             <a:chExt cx="919561" cy="604044"/>
@@ -22240,6 +22240,364 @@
           </a:prstGeom>
         </p:spPr>
       </p:pic>
+      <p:grpSp>
+        <p:nvGrpSpPr>
+          <p:cNvPr id="9" name="Group 8">
+            <a:extLst>
+              <a:ext uri="{FF2B5EF4-FFF2-40B4-BE49-F238E27FC236}">
+                <a16:creationId xmlns:a16="http://schemas.microsoft.com/office/drawing/2014/main" id="{6732041E-49AA-4103-AD04-8D5BCA461272}"/>
+              </a:ext>
+            </a:extLst>
+          </p:cNvPr>
+          <p:cNvGrpSpPr/>
+          <p:nvPr/>
+        </p:nvGrpSpPr>
+        <p:grpSpPr>
+          <a:xfrm>
+            <a:off x="10473548" y="2185302"/>
+            <a:ext cx="1045994" cy="604044"/>
+            <a:chOff x="10524570" y="5888954"/>
+            <a:chExt cx="1045994" cy="604044"/>
+          </a:xfrm>
+        </p:grpSpPr>
+        <p:pic>
+          <p:nvPicPr>
+            <p:cNvPr id="161" name="Graphic 160">
+              <a:extLst>
+                <a:ext uri="{FF2B5EF4-FFF2-40B4-BE49-F238E27FC236}">
+                  <a16:creationId xmlns:a16="http://schemas.microsoft.com/office/drawing/2014/main" id="{3BA2EEDC-F7B2-490A-94BA-1351572329F4}"/>
+                </a:ext>
+              </a:extLst>
+            </p:cNvPr>
+            <p:cNvPicPr>
+              <a:picLocks noChangeAspect="1"/>
+            </p:cNvPicPr>
+            <p:nvPr/>
+          </p:nvPicPr>
+          <p:blipFill>
+            <a:blip r:embed="rId36">
+              <a:extLst>
+                <a:ext uri="{28A0092B-C50C-407E-A947-70E740481C1C}">
+                  <a14:useLocalDpi xmlns:a14="http://schemas.microsoft.com/office/drawing/2010/main" val="0"/>
+                </a:ext>
+                <a:ext uri="{96DAC541-7B7A-43D3-8B79-37D633B846F1}">
+                  <asvg:svgBlip xmlns:asvg="http://schemas.microsoft.com/office/drawing/2016/SVG/main" r:embed="rId37"/>
+                </a:ext>
+              </a:extLst>
+            </a:blip>
+            <a:stretch>
+              <a:fillRect/>
+            </a:stretch>
+          </p:blipFill>
+          <p:spPr>
+            <a:xfrm>
+              <a:off x="10951983" y="5948777"/>
+              <a:ext cx="277801" cy="312463"/>
+            </a:xfrm>
+            <a:prstGeom prst="rect">
+              <a:avLst/>
+            </a:prstGeom>
+          </p:spPr>
+        </p:pic>
+        <p:sp>
+          <p:nvSpPr>
+            <p:cNvPr id="186" name="Rectangle: Rounded Corners 185">
+              <a:extLst>
+                <a:ext uri="{FF2B5EF4-FFF2-40B4-BE49-F238E27FC236}">
+                  <a16:creationId xmlns:a16="http://schemas.microsoft.com/office/drawing/2014/main" id="{96789BDC-29E5-482A-8175-0A4DD2536720}"/>
+                </a:ext>
+              </a:extLst>
+            </p:cNvPr>
+            <p:cNvSpPr/>
+            <p:nvPr/>
+          </p:nvSpPr>
+          <p:spPr>
+            <a:xfrm>
+              <a:off x="10587787" y="5888954"/>
+              <a:ext cx="919560" cy="604044"/>
+            </a:xfrm>
+            <a:prstGeom prst="roundRect">
+              <a:avLst/>
+            </a:prstGeom>
+            <a:noFill/>
+            <a:ln>
+              <a:solidFill>
+                <a:srgbClr val="0070C0"/>
+              </a:solidFill>
+              <a:prstDash val="sysDot"/>
+              <a:extLst>
+                <a:ext uri="{C807C97D-BFC1-408E-A445-0C87EB9F89A2}">
+                  <ask:lineSketchStyleProps xmlns:ask="http://schemas.microsoft.com/office/drawing/2018/sketchyshapes" sd="1219033472">
+                    <a:custGeom>
+                      <a:avLst/>
+                      <a:gdLst>
+                        <a:gd name="connsiteX0" fmla="*/ 0 w 1060525"/>
+                        <a:gd name="connsiteY0" fmla="*/ 158238 h 949411"/>
+                        <a:gd name="connsiteX1" fmla="*/ 158238 w 1060525"/>
+                        <a:gd name="connsiteY1" fmla="*/ 0 h 949411"/>
+                        <a:gd name="connsiteX2" fmla="*/ 545143 w 1060525"/>
+                        <a:gd name="connsiteY2" fmla="*/ 0 h 949411"/>
+                        <a:gd name="connsiteX3" fmla="*/ 902287 w 1060525"/>
+                        <a:gd name="connsiteY3" fmla="*/ 0 h 949411"/>
+                        <a:gd name="connsiteX4" fmla="*/ 1060525 w 1060525"/>
+                        <a:gd name="connsiteY4" fmla="*/ 158238 h 949411"/>
+                        <a:gd name="connsiteX5" fmla="*/ 1060525 w 1060525"/>
+                        <a:gd name="connsiteY5" fmla="*/ 462047 h 949411"/>
+                        <a:gd name="connsiteX6" fmla="*/ 1060525 w 1060525"/>
+                        <a:gd name="connsiteY6" fmla="*/ 791173 h 949411"/>
+                        <a:gd name="connsiteX7" fmla="*/ 902287 w 1060525"/>
+                        <a:gd name="connsiteY7" fmla="*/ 949411 h 949411"/>
+                        <a:gd name="connsiteX8" fmla="*/ 545143 w 1060525"/>
+                        <a:gd name="connsiteY8" fmla="*/ 949411 h 949411"/>
+                        <a:gd name="connsiteX9" fmla="*/ 158238 w 1060525"/>
+                        <a:gd name="connsiteY9" fmla="*/ 949411 h 949411"/>
+                        <a:gd name="connsiteX10" fmla="*/ 0 w 1060525"/>
+                        <a:gd name="connsiteY10" fmla="*/ 791173 h 949411"/>
+                        <a:gd name="connsiteX11" fmla="*/ 0 w 1060525"/>
+                        <a:gd name="connsiteY11" fmla="*/ 493694 h 949411"/>
+                        <a:gd name="connsiteX12" fmla="*/ 0 w 1060525"/>
+                        <a:gd name="connsiteY12" fmla="*/ 158238 h 949411"/>
+                      </a:gdLst>
+                      <a:ahLst/>
+                      <a:cxnLst>
+                        <a:cxn ang="0">
+                          <a:pos x="connsiteX0" y="connsiteY0"/>
+                        </a:cxn>
+                        <a:cxn ang="0">
+                          <a:pos x="connsiteX1" y="connsiteY1"/>
+                        </a:cxn>
+                        <a:cxn ang="0">
+                          <a:pos x="connsiteX2" y="connsiteY2"/>
+                        </a:cxn>
+                        <a:cxn ang="0">
+                          <a:pos x="connsiteX3" y="connsiteY3"/>
+                        </a:cxn>
+                        <a:cxn ang="0">
+                          <a:pos x="connsiteX4" y="connsiteY4"/>
+                        </a:cxn>
+                        <a:cxn ang="0">
+                          <a:pos x="connsiteX5" y="connsiteY5"/>
+                        </a:cxn>
+                        <a:cxn ang="0">
+                          <a:pos x="connsiteX6" y="connsiteY6"/>
+                        </a:cxn>
+                        <a:cxn ang="0">
+                          <a:pos x="connsiteX7" y="connsiteY7"/>
+                        </a:cxn>
+                        <a:cxn ang="0">
+                          <a:pos x="connsiteX8" y="connsiteY8"/>
+                        </a:cxn>
+                        <a:cxn ang="0">
+                          <a:pos x="connsiteX9" y="connsiteY9"/>
+                        </a:cxn>
+                        <a:cxn ang="0">
+                          <a:pos x="connsiteX10" y="connsiteY10"/>
+                        </a:cxn>
+                        <a:cxn ang="0">
+                          <a:pos x="connsiteX11" y="connsiteY11"/>
+                        </a:cxn>
+                        <a:cxn ang="0">
+                          <a:pos x="connsiteX12" y="connsiteY12"/>
+                        </a:cxn>
+                      </a:cxnLst>
+                      <a:rect l="l" t="t" r="r" b="b"/>
+                      <a:pathLst>
+                        <a:path w="1060525" h="949411" extrusionOk="0">
+                          <a:moveTo>
+                            <a:pt x="0" y="158238"/>
+                          </a:moveTo>
+                          <a:cubicBezTo>
+                            <a:pt x="-6968" y="66548"/>
+                            <a:pt x="48378" y="8433"/>
+                            <a:pt x="158238" y="0"/>
+                          </a:cubicBezTo>
+                          <a:cubicBezTo>
+                            <a:pt x="349666" y="-16998"/>
+                            <a:pt x="425630" y="45732"/>
+                            <a:pt x="545143" y="0"/>
+                          </a:cubicBezTo>
+                          <a:cubicBezTo>
+                            <a:pt x="664657" y="-45732"/>
+                            <a:pt x="820159" y="12596"/>
+                            <a:pt x="902287" y="0"/>
+                          </a:cubicBezTo>
+                          <a:cubicBezTo>
+                            <a:pt x="971578" y="-9904"/>
+                            <a:pt x="1073159" y="76883"/>
+                            <a:pt x="1060525" y="158238"/>
+                          </a:cubicBezTo>
+                          <a:cubicBezTo>
+                            <a:pt x="1070157" y="289612"/>
+                            <a:pt x="1042806" y="329690"/>
+                            <a:pt x="1060525" y="462047"/>
+                          </a:cubicBezTo>
+                          <a:cubicBezTo>
+                            <a:pt x="1078244" y="594404"/>
+                            <a:pt x="1038376" y="643113"/>
+                            <a:pt x="1060525" y="791173"/>
+                          </a:cubicBezTo>
+                          <a:cubicBezTo>
+                            <a:pt x="1059057" y="864564"/>
+                            <a:pt x="981426" y="960880"/>
+                            <a:pt x="902287" y="949411"/>
+                          </a:cubicBezTo>
+                          <a:cubicBezTo>
+                            <a:pt x="753690" y="960561"/>
+                            <a:pt x="631505" y="915417"/>
+                            <a:pt x="545143" y="949411"/>
+                          </a:cubicBezTo>
+                          <a:cubicBezTo>
+                            <a:pt x="458781" y="983405"/>
+                            <a:pt x="339279" y="911965"/>
+                            <a:pt x="158238" y="949411"/>
+                          </a:cubicBezTo>
+                          <a:cubicBezTo>
+                            <a:pt x="73589" y="953494"/>
+                            <a:pt x="1058" y="889527"/>
+                            <a:pt x="0" y="791173"/>
+                          </a:cubicBezTo>
+                          <a:cubicBezTo>
+                            <a:pt x="-31957" y="731446"/>
+                            <a:pt x="21377" y="595516"/>
+                            <a:pt x="0" y="493694"/>
+                          </a:cubicBezTo>
+                          <a:cubicBezTo>
+                            <a:pt x="-21377" y="391872"/>
+                            <a:pt x="35644" y="296102"/>
+                            <a:pt x="0" y="158238"/>
+                          </a:cubicBezTo>
+                          <a:close/>
+                        </a:path>
+                      </a:pathLst>
+                    </a:custGeom>
+                    <ask:type>
+                      <ask:lineSketchNone/>
+                    </ask:type>
+                  </ask:lineSketchStyleProps>
+                </a:ext>
+              </a:extLst>
+            </a:ln>
+          </p:spPr>
+          <p:style>
+            <a:lnRef idx="2">
+              <a:schemeClr val="accent1">
+                <a:shade val="50000"/>
+              </a:schemeClr>
+            </a:lnRef>
+            <a:fillRef idx="1">
+              <a:schemeClr val="accent1"/>
+            </a:fillRef>
+            <a:effectRef idx="0">
+              <a:schemeClr val="accent1"/>
+            </a:effectRef>
+            <a:fontRef idx="minor">
+              <a:schemeClr val="lt1"/>
+            </a:fontRef>
+          </p:style>
+          <p:txBody>
+            <a:bodyPr rtlCol="0" anchor="ctr"/>
+            <a:lstStyle/>
+            <a:p>
+              <a:pPr marL="0" marR="0" lvl="0" indent="0" algn="ctr" defTabSz="914400" rtl="0" eaLnBrk="1" fontAlgn="auto" latinLnBrk="0" hangingPunct="1">
+                <a:lnSpc>
+                  <a:spcPct val="100000"/>
+                </a:lnSpc>
+                <a:spcBef>
+                  <a:spcPts val="0"/>
+                </a:spcBef>
+                <a:spcAft>
+                  <a:spcPts val="0"/>
+                </a:spcAft>
+                <a:buClrTx/>
+                <a:buSzTx/>
+                <a:buFontTx/>
+                <a:buNone/>
+                <a:tabLst/>
+                <a:defRPr/>
+              </a:pPr>
+              <a:endParaRPr kumimoji="0" lang="en-US" sz="1800" b="0" i="0" u="none" strike="noStrike" kern="1200" cap="none" spc="0" normalizeH="0" baseline="0" noProof="0">
+                <a:ln>
+                  <a:noFill/>
+                </a:ln>
+                <a:solidFill>
+                  <a:prstClr val="white"/>
+                </a:solidFill>
+                <a:effectLst/>
+                <a:uLnTx/>
+                <a:uFillTx/>
+                <a:latin typeface="Segoe UI"/>
+                <a:ea typeface="+mn-ea"/>
+                <a:cs typeface="+mn-cs"/>
+              </a:endParaRPr>
+            </a:p>
+          </p:txBody>
+        </p:sp>
+        <p:sp>
+          <p:nvSpPr>
+            <p:cNvPr id="187" name="TextBox 186">
+              <a:extLst>
+                <a:ext uri="{FF2B5EF4-FFF2-40B4-BE49-F238E27FC236}">
+                  <a16:creationId xmlns:a16="http://schemas.microsoft.com/office/drawing/2014/main" id="{FDB09116-6C44-4538-BF5A-81903D6204D1}"/>
+                </a:ext>
+              </a:extLst>
+            </p:cNvPr>
+            <p:cNvSpPr txBox="1"/>
+            <p:nvPr/>
+          </p:nvSpPr>
+          <p:spPr>
+            <a:xfrm>
+              <a:off x="10524570" y="6263403"/>
+              <a:ext cx="1045994" cy="215444"/>
+            </a:xfrm>
+            <a:prstGeom prst="rect">
+              <a:avLst/>
+            </a:prstGeom>
+            <a:noFill/>
+          </p:spPr>
+          <p:txBody>
+            <a:bodyPr wrap="square" rtlCol="0">
+              <a:spAutoFit/>
+            </a:bodyPr>
+            <a:lstStyle/>
+            <a:p>
+              <a:pPr marL="0" marR="0" lvl="0" indent="0" algn="ctr" defTabSz="914400" rtl="0" eaLnBrk="1" fontAlgn="auto" latinLnBrk="0" hangingPunct="1">
+                <a:lnSpc>
+                  <a:spcPct val="100000"/>
+                </a:lnSpc>
+                <a:spcBef>
+                  <a:spcPts val="0"/>
+                </a:spcBef>
+                <a:spcAft>
+                  <a:spcPts val="0"/>
+                </a:spcAft>
+                <a:buClrTx/>
+                <a:buSzTx/>
+                <a:buFontTx/>
+                <a:buNone/>
+                <a:tabLst/>
+                <a:defRPr/>
+              </a:pPr>
+              <a:r>
+                <a:rPr kumimoji="0" lang="en-US" sz="800" b="0" i="0" u="none" strike="noStrike" kern="1200" cap="none" spc="0" normalizeH="0" baseline="0" noProof="0" dirty="0">
+                  <a:ln>
+                    <a:noFill/>
+                  </a:ln>
+                  <a:solidFill>
+                    <a:prstClr val="black"/>
+                  </a:solidFill>
+                  <a:effectLst/>
+                  <a:uLnTx/>
+                  <a:uFillTx/>
+                  <a:latin typeface="Segoe UI Semibold" panose="020B0702040204020203" pitchFamily="34" charset="0"/>
+                  <a:ea typeface="+mn-ea"/>
+                  <a:cs typeface="Segoe UI Semibold" panose="020B0702040204020203" pitchFamily="34" charset="0"/>
+                </a:rPr>
+                <a:t>Data Share</a:t>
+              </a:r>
+            </a:p>
+          </p:txBody>
+        </p:sp>
+      </p:grpSp>
     </p:spTree>
     <p:extLst>
       <p:ext uri="{BB962C8B-B14F-4D97-AF65-F5344CB8AC3E}">
@@ -36901,15 +37259,6 @@
 </file>
 
 <file path=customXml/item1.xml><?xml version="1.0" encoding="utf-8"?>
-<?mso-contentType ?>
-<FormTemplates xmlns="http://schemas.microsoft.com/sharepoint/v3/contenttype/forms">
-  <Display>DocumentLibraryForm</Display>
-  <Edit>DocumentLibraryForm</Edit>
-  <New>DocumentLibraryForm</New>
-</FormTemplates>
-</file>
-
-<file path=customXml/item2.xml><?xml version="1.0" encoding="utf-8"?>
 <ct:contentTypeSchema xmlns:ct="http://schemas.microsoft.com/office/2006/metadata/contentType" xmlns:ma="http://schemas.microsoft.com/office/2006/metadata/properties/metaAttributes" ct:_="" ma:_="" ma:contentTypeName="Document" ma:contentTypeID="0x010100E91BF5703B036B41A0430F443AD95DB8" ma:contentTypeVersion="19" ma:contentTypeDescription="Create a new document." ma:contentTypeScope="" ma:versionID="ffaa6361bbca0f44b1c0ce4466c0db6d">
   <xsd:schema xmlns:xsd="http://www.w3.org/2001/XMLSchema" xmlns:xs="http://www.w3.org/2001/XMLSchema" xmlns:p="http://schemas.microsoft.com/office/2006/metadata/properties" xmlns:ns1="http://schemas.microsoft.com/sharepoint/v3" xmlns:ns3="d02dc944-d877-4fdc-84c6-4fb412a3c730" xmlns:ns4="912cb619-99d2-4794-acea-8354d3da3f58" targetNamespace="http://schemas.microsoft.com/office/2006/metadata/properties" ma:root="true" ma:fieldsID="b40e0413ab5e745cbe4ceab969b882de" ns1:_="" ns3:_="" ns4:_="">
     <xsd:import namespace="http://schemas.microsoft.com/sharepoint/v3"/>
@@ -37183,7 +37532,7 @@
 </ct:contentTypeSchema>
 </file>
 
-<file path=customXml/item3.xml><?xml version="1.0" encoding="utf-8"?>
+<file path=customXml/item2.xml><?xml version="1.0" encoding="utf-8"?>
 <p:properties xmlns:p="http://schemas.microsoft.com/office/2006/metadata/properties" xmlns:xsi="http://www.w3.org/2001/XMLSchema-instance" xmlns:pc="http://schemas.microsoft.com/office/infopath/2007/PartnerControls">
   <documentManagement>
     <_ip_UnifiedCompliancePolicyUIAction xmlns="http://schemas.microsoft.com/sharepoint/v3" xsi:nil="true"/>
@@ -37193,15 +37542,16 @@
 </p:properties>
 </file>
 
-<file path=customXml/itemProps1.xml><?xml version="1.0" encoding="utf-8"?>
-<ds:datastoreItem xmlns:ds="http://schemas.openxmlformats.org/officeDocument/2006/customXml" ds:itemID="{D980A987-62EE-4DAB-81C0-1DF71B5A84CA}">
-  <ds:schemaRefs>
-    <ds:schemaRef ds:uri="http://schemas.microsoft.com/sharepoint/v3/contenttype/forms"/>
-  </ds:schemaRefs>
-</ds:datastoreItem>
+<file path=customXml/item3.xml><?xml version="1.0" encoding="utf-8"?>
+<?mso-contentType ?>
+<FormTemplates xmlns="http://schemas.microsoft.com/sharepoint/v3/contenttype/forms">
+  <Display>DocumentLibraryForm</Display>
+  <Edit>DocumentLibraryForm</Edit>
+  <New>DocumentLibraryForm</New>
+</FormTemplates>
 </file>
 
-<file path=customXml/itemProps2.xml><?xml version="1.0" encoding="utf-8"?>
+<file path=customXml/itemProps1.xml><?xml version="1.0" encoding="utf-8"?>
 <ds:datastoreItem xmlns:ds="http://schemas.openxmlformats.org/officeDocument/2006/customXml" ds:itemID="{E55631F5-088C-41CD-BD8B-01F7952F1308}">
   <ds:schemaRefs>
     <ds:schemaRef ds:uri="http://schemas.microsoft.com/office/2006/metadata/contentType"/>
@@ -37221,7 +37571,7 @@
 </ds:datastoreItem>
 </file>
 
-<file path=customXml/itemProps3.xml><?xml version="1.0" encoding="utf-8"?>
+<file path=customXml/itemProps2.xml><?xml version="1.0" encoding="utf-8"?>
 <ds:datastoreItem xmlns:ds="http://schemas.openxmlformats.org/officeDocument/2006/customXml" ds:itemID="{4E00FC4D-E764-4B84-A53F-BFAC454B6160}">
   <ds:schemaRefs>
     <ds:schemaRef ds:uri="http://schemas.microsoft.com/office/2006/metadata/properties"/>
@@ -37237,4 +37587,12 @@
     <ds:schemaRef ds:uri="http://schemas.microsoft.com/sharepoint/v3"/>
   </ds:schemaRefs>
 </ds:datastoreItem>
+</file>
+
+<file path=customXml/itemProps3.xml><?xml version="1.0" encoding="utf-8"?>
+<ds:datastoreItem xmlns:ds="http://schemas.openxmlformats.org/officeDocument/2006/customXml" ds:itemID="{D980A987-62EE-4DAB-81C0-1DF71B5A84CA}">
+  <ds:schemaRefs>
+    <ds:schemaRef ds:uri="http://schemas.microsoft.com/sharepoint/v3/contenttype/forms"/>
+  </ds:schemaRefs>
+</ds:datastoreItem>
 </file>
</xml_diff>